<commit_message>
Updated after session at Codestock 2018
</commit_message>
<xml_diff>
--- a/Slides.pptx
+++ b/Slides.pptx
@@ -5,11 +5,11 @@
     <p:sldMasterId id="2147483648" r:id="rId1"/>
   </p:sldMasterIdLst>
   <p:notesMasterIdLst>
-    <p:notesMasterId r:id="rId13"/>
+    <p:notesMasterId r:id="rId12"/>
   </p:notesMasterIdLst>
   <p:sldIdLst>
     <p:sldId id="256" r:id="rId2"/>
-    <p:sldId id="299" r:id="rId3"/>
+    <p:sldId id="300" r:id="rId3"/>
     <p:sldId id="292" r:id="rId4"/>
     <p:sldId id="296" r:id="rId5"/>
     <p:sldId id="291" r:id="rId6"/>
@@ -17,8 +17,7 @@
     <p:sldId id="289" r:id="rId8"/>
     <p:sldId id="293" r:id="rId9"/>
     <p:sldId id="294" r:id="rId10"/>
-    <p:sldId id="297" r:id="rId11"/>
-    <p:sldId id="298" r:id="rId12"/>
+    <p:sldId id="298" r:id="rId11"/>
   </p:sldIdLst>
   <p:sldSz cx="12192000" cy="6858000"/>
   <p:notesSz cx="6858000" cy="9144000"/>
@@ -125,6 +124,10 @@
 </p:presentation>
 </file>
 
+<file path=ppt/revisionInfo.xml><?xml version="1.0" encoding="utf-8"?>
+<p1510:revInfo xmlns:a="http://schemas.openxmlformats.org/drawingml/2006/main" xmlns:r="http://schemas.openxmlformats.org/officeDocument/2006/relationships" xmlns:p1510="http://schemas.microsoft.com/office/powerpoint/2015/10/main"/>
+</file>
+
 <file path=ppt/notesMasters/notesMaster1.xml><?xml version="1.0" encoding="utf-8"?>
 <p:notesMaster xmlns:a="http://schemas.openxmlformats.org/drawingml/2006/main" xmlns:r="http://schemas.openxmlformats.org/officeDocument/2006/relationships" xmlns:p="http://schemas.openxmlformats.org/presentationml/2006/main">
   <p:cSld>
@@ -207,7 +210,7 @@
           <a:p>
             <a:fld id="{99DFD45C-204D-49D0-AA7B-31A6035D5E91}" type="datetimeFigureOut">
               <a:rPr lang="en-US" smtClean="0"/>
-              <a:t>8/19/2016</a:t>
+              <a:t>4/25/2018</a:t>
             </a:fld>
             <a:endParaRPr lang="en-US"/>
           </a:p>
@@ -613,18 +616,6 @@
           <a:bodyPr/>
           <a:lstStyle/>
           <a:p>
-            <a:r>
-              <a:rPr lang="en-US" dirty="0"/>
-              <a:t>V</a:t>
-            </a:r>
-            <a:r>
-              <a:rPr lang="en-US" baseline="0" dirty="0"/>
-              <a:t>S plugin. Works in CE. Benefits. Drawbacks: slows down VS, but only really noticeable on </a:t>
-            </a:r>
-            <a:r>
-              <a:rPr lang="en-US" baseline="0"/>
-              <a:t>older/slower machines</a:t>
-            </a:r>
             <a:endParaRPr lang="en-US" dirty="0"/>
           </a:p>
         </p:txBody>
@@ -646,7 +637,7 @@
           <a:p>
             <a:fld id="{C16E5CF5-7271-4C13-8455-0600239432B5}" type="slidenum">
               <a:rPr lang="en-US" smtClean="0"/>
-              <a:t>3</a:t>
+              <a:t>2</a:t>
             </a:fld>
             <a:endParaRPr lang="en-US"/>
           </a:p>
@@ -655,7 +646,7 @@
     </p:spTree>
     <p:extLst>
       <p:ext uri="{BB962C8B-B14F-4D97-AF65-F5344CB8AC3E}">
-        <p14:creationId xmlns:p14="http://schemas.microsoft.com/office/powerpoint/2010/main" val="3656418862"/>
+        <p14:creationId xmlns:p14="http://schemas.microsoft.com/office/powerpoint/2010/main" val="2697818705"/>
       </p:ext>
     </p:extLst>
   </p:cSld>
@@ -709,6 +700,18 @@
           <a:bodyPr/>
           <a:lstStyle/>
           <a:p>
+            <a:r>
+              <a:rPr lang="en-US" dirty="0"/>
+              <a:t>V</a:t>
+            </a:r>
+            <a:r>
+              <a:rPr lang="en-US" baseline="0" dirty="0"/>
+              <a:t>S plugin. Works in CE. Benefits. Drawbacks: slows down VS, but only really noticeable on </a:t>
+            </a:r>
+            <a:r>
+              <a:rPr lang="en-US" baseline="0"/>
+              <a:t>older/slower machines</a:t>
+            </a:r>
             <a:endParaRPr lang="en-US" dirty="0"/>
           </a:p>
         </p:txBody>
@@ -730,7 +733,7 @@
           <a:p>
             <a:fld id="{C16E5CF5-7271-4C13-8455-0600239432B5}" type="slidenum">
               <a:rPr lang="en-US" smtClean="0"/>
-              <a:t>4</a:t>
+              <a:t>3</a:t>
             </a:fld>
             <a:endParaRPr lang="en-US"/>
           </a:p>
@@ -739,7 +742,7 @@
     </p:spTree>
     <p:extLst>
       <p:ext uri="{BB962C8B-B14F-4D97-AF65-F5344CB8AC3E}">
-        <p14:creationId xmlns:p14="http://schemas.microsoft.com/office/powerpoint/2010/main" val="1354222227"/>
+        <p14:creationId xmlns:p14="http://schemas.microsoft.com/office/powerpoint/2010/main" val="3656418862"/>
       </p:ext>
     </p:extLst>
   </p:cSld>
@@ -814,7 +817,7 @@
           <a:p>
             <a:fld id="{C16E5CF5-7271-4C13-8455-0600239432B5}" type="slidenum">
               <a:rPr lang="en-US" smtClean="0"/>
-              <a:t>6</a:t>
+              <a:t>4</a:t>
             </a:fld>
             <a:endParaRPr lang="en-US"/>
           </a:p>
@@ -823,7 +826,7 @@
     </p:spTree>
     <p:extLst>
       <p:ext uri="{BB962C8B-B14F-4D97-AF65-F5344CB8AC3E}">
-        <p14:creationId xmlns:p14="http://schemas.microsoft.com/office/powerpoint/2010/main" val="2594387244"/>
+        <p14:creationId xmlns:p14="http://schemas.microsoft.com/office/powerpoint/2010/main" val="1354222227"/>
       </p:ext>
     </p:extLst>
   </p:cSld>
@@ -898,7 +901,7 @@
           <a:p>
             <a:fld id="{C16E5CF5-7271-4C13-8455-0600239432B5}" type="slidenum">
               <a:rPr lang="en-US" smtClean="0"/>
-              <a:t>7</a:t>
+              <a:t>6</a:t>
             </a:fld>
             <a:endParaRPr lang="en-US"/>
           </a:p>
@@ -907,7 +910,7 @@
     </p:spTree>
     <p:extLst>
       <p:ext uri="{BB962C8B-B14F-4D97-AF65-F5344CB8AC3E}">
-        <p14:creationId xmlns:p14="http://schemas.microsoft.com/office/powerpoint/2010/main" val="1378127547"/>
+        <p14:creationId xmlns:p14="http://schemas.microsoft.com/office/powerpoint/2010/main" val="2594387244"/>
       </p:ext>
     </p:extLst>
   </p:cSld>
@@ -982,7 +985,7 @@
           <a:p>
             <a:fld id="{C16E5CF5-7271-4C13-8455-0600239432B5}" type="slidenum">
               <a:rPr lang="en-US" smtClean="0"/>
-              <a:t>9</a:t>
+              <a:t>7</a:t>
             </a:fld>
             <a:endParaRPr lang="en-US"/>
           </a:p>
@@ -991,7 +994,7 @@
     </p:spTree>
     <p:extLst>
       <p:ext uri="{BB962C8B-B14F-4D97-AF65-F5344CB8AC3E}">
-        <p14:creationId xmlns:p14="http://schemas.microsoft.com/office/powerpoint/2010/main" val="592552816"/>
+        <p14:creationId xmlns:p14="http://schemas.microsoft.com/office/powerpoint/2010/main" val="1378127547"/>
       </p:ext>
     </p:extLst>
   </p:cSld>
@@ -1066,7 +1069,7 @@
           <a:p>
             <a:fld id="{C16E5CF5-7271-4C13-8455-0600239432B5}" type="slidenum">
               <a:rPr lang="en-US" smtClean="0"/>
-              <a:t>10</a:t>
+              <a:t>9</a:t>
             </a:fld>
             <a:endParaRPr lang="en-US"/>
           </a:p>
@@ -1075,7 +1078,7 @@
     </p:spTree>
     <p:extLst>
       <p:ext uri="{BB962C8B-B14F-4D97-AF65-F5344CB8AC3E}">
-        <p14:creationId xmlns:p14="http://schemas.microsoft.com/office/powerpoint/2010/main" val="2666050336"/>
+        <p14:creationId xmlns:p14="http://schemas.microsoft.com/office/powerpoint/2010/main" val="592552816"/>
       </p:ext>
     </p:extLst>
   </p:cSld>
@@ -1311,7 +1314,7 @@
           <a:p>
             <a:fld id="{96DFF08F-DC6B-4601-B491-B0F83F6DD2DA}" type="datetimeFigureOut">
               <a:rPr lang="en-US" dirty="0"/>
-              <a:t>8/19/2016</a:t>
+              <a:t>4/25/2018</a:t>
             </a:fld>
             <a:endParaRPr lang="en-US" dirty="0"/>
           </a:p>
@@ -1514,7 +1517,7 @@
           <a:p>
             <a:fld id="{96DFF08F-DC6B-4601-B491-B0F83F6DD2DA}" type="datetimeFigureOut">
               <a:rPr lang="en-US" dirty="0"/>
-              <a:t>8/19/2016</a:t>
+              <a:t>4/25/2018</a:t>
             </a:fld>
             <a:endParaRPr lang="en-US" dirty="0"/>
           </a:p>
@@ -1765,7 +1768,7 @@
           <a:p>
             <a:fld id="{96DFF08F-DC6B-4601-B491-B0F83F6DD2DA}" type="datetimeFigureOut">
               <a:rPr lang="en-US" dirty="0"/>
-              <a:t>8/19/2016</a:t>
+              <a:t>4/25/2018</a:t>
             </a:fld>
             <a:endParaRPr lang="en-US" dirty="0"/>
           </a:p>
@@ -1930,7 +1933,7 @@
           <a:p>
             <a:fld id="{D62CEF3B-A037-46D0-B02C-1428F07E9383}" type="datetimeFigureOut">
               <a:rPr lang="en-US" dirty="0"/>
-              <a:t>8/19/2016</a:t>
+              <a:t>4/25/2018</a:t>
             </a:fld>
             <a:endParaRPr lang="en-US" dirty="0"/>
           </a:p>
@@ -2268,7 +2271,7 @@
           <a:p>
             <a:fld id="{96DFF08F-DC6B-4601-B491-B0F83F6DD2DA}" type="datetimeFigureOut">
               <a:rPr lang="en-US" dirty="0"/>
-              <a:t>8/19/2016</a:t>
+              <a:t>4/25/2018</a:t>
             </a:fld>
             <a:endParaRPr lang="en-US" dirty="0"/>
           </a:p>
@@ -2538,7 +2541,7 @@
           <a:p>
             <a:fld id="{96DFF08F-DC6B-4601-B491-B0F83F6DD2DA}" type="datetimeFigureOut">
               <a:rPr lang="en-US" dirty="0"/>
-              <a:t>8/19/2016</a:t>
+              <a:t>4/25/2018</a:t>
             </a:fld>
             <a:endParaRPr lang="en-US" dirty="0"/>
           </a:p>
@@ -2912,7 +2915,7 @@
           <a:p>
             <a:fld id="{96DFF08F-DC6B-4601-B491-B0F83F6DD2DA}" type="datetimeFigureOut">
               <a:rPr lang="en-US" dirty="0"/>
-              <a:t>8/19/2016</a:t>
+              <a:t>4/25/2018</a:t>
             </a:fld>
             <a:endParaRPr lang="en-US" dirty="0"/>
           </a:p>
@@ -3025,7 +3028,7 @@
           <a:p>
             <a:fld id="{96DFF08F-DC6B-4601-B491-B0F83F6DD2DA}" type="datetimeFigureOut">
               <a:rPr lang="en-US" dirty="0"/>
-              <a:t>8/19/2016</a:t>
+              <a:t>4/25/2018</a:t>
             </a:fld>
             <a:endParaRPr lang="en-US" dirty="0"/>
           </a:p>
@@ -3192,7 +3195,7 @@
             <a:fld id="{96DFF08F-DC6B-4601-B491-B0F83F6DD2DA}" type="datetimeFigureOut">
               <a:rPr lang="en-US" dirty="0"/>
               <a:pPr/>
-              <a:t>8/19/2016</a:t>
+              <a:t>4/25/2018</a:t>
             </a:fld>
             <a:endParaRPr lang="en-US" dirty="0"/>
           </a:p>
@@ -3543,7 +3546,7 @@
             <a:fld id="{96DFF08F-DC6B-4601-B491-B0F83F6DD2DA}" type="datetimeFigureOut">
               <a:rPr lang="en-US" dirty="0"/>
               <a:pPr/>
-              <a:t>8/19/2016</a:t>
+              <a:t>4/25/2018</a:t>
             </a:fld>
             <a:endParaRPr lang="en-US" dirty="0"/>
           </a:p>
@@ -3916,7 +3919,7 @@
           <a:p>
             <a:fld id="{96DFF08F-DC6B-4601-B491-B0F83F6DD2DA}" type="datetimeFigureOut">
               <a:rPr lang="en-US" dirty="0"/>
-              <a:t>8/19/2016</a:t>
+              <a:t>4/25/2018</a:t>
             </a:fld>
             <a:endParaRPr lang="en-US" dirty="0"/>
           </a:p>
@@ -4199,7 +4202,7 @@
             <a:fld id="{96DFF08F-DC6B-4601-B491-B0F83F6DD2DA}" type="datetimeFigureOut">
               <a:rPr lang="en-US" dirty="0"/>
               <a:pPr/>
-              <a:t>8/19/2016</a:t>
+              <a:t>4/25/2018</a:t>
             </a:fld>
             <a:endParaRPr lang="en-US" dirty="0"/>
           </a:p>
@@ -5123,59 +5126,6 @@
       </p:grpSpPr>
       <p:sp>
         <p:nvSpPr>
-          <p:cNvPr id="4" name="Title 3"/>
-          <p:cNvSpPr>
-            <a:spLocks noGrp="1"/>
-          </p:cNvSpPr>
-          <p:nvPr>
-            <p:ph type="title"/>
-          </p:nvPr>
-        </p:nvSpPr>
-        <p:spPr/>
-        <p:txBody>
-          <a:bodyPr/>
-          <a:lstStyle/>
-          <a:p>
-            <a:pPr algn="ctr"/>
-            <a:r>
-              <a:rPr lang="en-US" dirty="0"/>
-              <a:t>Questions?</a:t>
-            </a:r>
-          </a:p>
-        </p:txBody>
-      </p:sp>
-    </p:spTree>
-    <p:extLst>
-      <p:ext uri="{BB962C8B-B14F-4D97-AF65-F5344CB8AC3E}">
-        <p14:creationId xmlns:p14="http://schemas.microsoft.com/office/powerpoint/2010/main" val="3535348998"/>
-      </p:ext>
-    </p:extLst>
-  </p:cSld>
-  <p:clrMapOvr>
-    <a:masterClrMapping/>
-  </p:clrMapOvr>
-</p:sld>
-</file>
-
-<file path=ppt/slides/slide11.xml><?xml version="1.0" encoding="utf-8"?>
-<p:sld xmlns:a="http://schemas.openxmlformats.org/drawingml/2006/main" xmlns:r="http://schemas.openxmlformats.org/officeDocument/2006/relationships" xmlns:p="http://schemas.openxmlformats.org/presentationml/2006/main">
-  <p:cSld>
-    <p:spTree>
-      <p:nvGrpSpPr>
-        <p:cNvPr id="1" name=""/>
-        <p:cNvGrpSpPr/>
-        <p:nvPr/>
-      </p:nvGrpSpPr>
-      <p:grpSpPr>
-        <a:xfrm>
-          <a:off x="0" y="0"/>
-          <a:ext cx="0" cy="0"/>
-          <a:chOff x="0" y="0"/>
-          <a:chExt cx="0" cy="0"/>
-        </a:xfrm>
-      </p:grpSpPr>
-      <p:sp>
-        <p:nvSpPr>
           <p:cNvPr id="2" name="Title 1"/>
           <p:cNvSpPr>
             <a:spLocks noGrp="1"/>
@@ -5904,7 +5854,7 @@
           <p:nvPr/>
         </p:nvPicPr>
         <p:blipFill>
-          <a:blip r:embed="rId2" cstate="print">
+          <a:blip r:embed="rId3" cstate="print">
             <a:extLst>
               <a:ext uri="{28A0092B-C50C-407E-A947-70E740481C1C}">
                 <a14:useLocalDpi xmlns:a14="http://schemas.microsoft.com/office/drawing/2010/main" val="0"/>
@@ -5938,21 +5888,14 @@
       </p:pic>
       <p:pic>
         <p:nvPicPr>
-          <p:cNvPr id="7" name="Picture 2" descr="http://nullquest.com/img/obalas.jpg"/>
+          <p:cNvPr id="7" name="Picture 2"/>
           <p:cNvPicPr>
             <a:picLocks noChangeAspect="1" noChangeArrowheads="1"/>
           </p:cNvPicPr>
           <p:nvPr/>
         </p:nvPicPr>
         <p:blipFill>
-          <a:blip r:embed="rId3">
-            <a:extLst>
-              <a:ext uri="{28A0092B-C50C-407E-A947-70E740481C1C}">
-                <a14:useLocalDpi xmlns:a14="http://schemas.microsoft.com/office/drawing/2010/main" val="0"/>
-              </a:ext>
-            </a:extLst>
-          </a:blip>
-          <a:srcRect/>
+          <a:blip r:embed="rId4"/>
           <a:stretch>
             <a:fillRect/>
           </a:stretch>
@@ -5986,7 +5929,7 @@
           <p:nvPr/>
         </p:nvPicPr>
         <p:blipFill>
-          <a:blip r:embed="rId4">
+          <a:blip r:embed="rId5">
             <a:extLst>
               <a:ext uri="{28A0092B-C50C-407E-A947-70E740481C1C}">
                 <a14:useLocalDpi xmlns:a14="http://schemas.microsoft.com/office/drawing/2010/main" val="0"/>
@@ -6029,7 +5972,7 @@
         <p:spPr>
           <a:xfrm>
             <a:off x="1293091" y="1627292"/>
-            <a:ext cx="7825509" cy="2374900"/>
+            <a:ext cx="6451317" cy="2374900"/>
           </a:xfrm>
           <a:prstGeom prst="rect">
             <a:avLst/>
@@ -6295,7 +6238,7 @@
             </a:r>
             <a:r>
               <a:rPr lang="en-US" b="1" cap="none" dirty="0"/>
-              <a:t>Microsoft MVP in C#</a:t>
+              <a:t>Microsoft MVP in .NET</a:t>
             </a:r>
           </a:p>
           <a:p>
@@ -6336,22 +6279,6 @@
             <a:r>
               <a:rPr lang="en-US" b="1" cap="none" dirty="0"/>
               <a:t> Design</a:t>
-            </a:r>
-          </a:p>
-          <a:p>
-            <a:r>
-              <a:rPr lang="en-US" dirty="0">
-                <a:latin typeface="FontAwesome" pitchFamily="50" charset="0"/>
-              </a:rPr>
-              <a:t></a:t>
-            </a:r>
-            <a:r>
-              <a:rPr lang="en-US" dirty="0"/>
-              <a:t> </a:t>
-            </a:r>
-            <a:r>
-              <a:rPr lang="en-US" b="1" cap="none" dirty="0"/>
-              <a:t>Building software that drives business</a:t>
             </a:r>
           </a:p>
           <a:p>
@@ -6699,7 +6626,7 @@
     </p:spTree>
     <p:extLst>
       <p:ext uri="{BB962C8B-B14F-4D97-AF65-F5344CB8AC3E}">
-        <p14:creationId xmlns:p14="http://schemas.microsoft.com/office/powerpoint/2010/main" val="3619056987"/>
+        <p14:creationId xmlns:p14="http://schemas.microsoft.com/office/powerpoint/2010/main" val="643858046"/>
       </p:ext>
     </p:extLst>
   </p:cSld>
@@ -6789,7 +6716,7 @@
           <a:graphicData uri="http://schemas.openxmlformats.org/presentationml/2006/ole">
             <mc:AlternateContent xmlns:mc="http://schemas.openxmlformats.org/markup-compatibility/2006">
               <mc:Choice xmlns:v="urn:schemas-microsoft-com:vml" Requires="v">
-                <p:oleObj spid="_x0000_s1034" name="Image" r:id="rId5" imgW="5282280" imgH="5257080" progId="Photoshop.Image.12">
+                <p:oleObj spid="_x0000_s1027" name="Image" r:id="rId5" imgW="5282280" imgH="5257080" progId="Photoshop.Image.12">
                   <p:embed/>
                 </p:oleObj>
               </mc:Choice>
@@ -6798,7 +6725,7 @@
                   <p:embed/>
                   <p:pic>
                     <p:nvPicPr>
-                      <p:cNvPr id="0" name=""/>
+                      <p:cNvPr id="4" name="Object 3"/>
                       <p:cNvPicPr/>
                       <p:nvPr/>
                     </p:nvPicPr>

</xml_diff>